<commit_message>
poster + review professores
</commit_message>
<xml_diff>
--- a/poster.pptx
+++ b/poster.pptx
@@ -3440,41 +3440,6 @@
       </p:sp>
       <p:pic>
         <p:nvPicPr>
-          <p:cNvPr id="5" name="Content Placeholder 4" descr="A map of portugal with black text&#10;&#10;Description automatically generated">
-            <a:extLst>
-              <a:ext uri="{FF2B5EF4-FFF2-40B4-BE49-F238E27FC236}">
-                <a16:creationId xmlns:a16="http://schemas.microsoft.com/office/drawing/2014/main" id="{A7FE3856-620E-0481-C89F-6A1E44AAA5E8}"/>
-              </a:ext>
-            </a:extLst>
-          </p:cNvPr>
-          <p:cNvPicPr>
-            <a:picLocks noGrp="1" noChangeAspect="1"/>
-          </p:cNvPicPr>
-          <p:nvPr>
-            <p:ph sz="half" idx="2"/>
-          </p:nvPr>
-        </p:nvPicPr>
-        <p:blipFill>
-          <a:blip r:embed="rId2" cstate="print">
-            <a:extLst>
-              <a:ext uri="{28A0092B-C50C-407E-A947-70E740481C1C}">
-                <a14:useLocalDpi xmlns:a14="http://schemas.microsoft.com/office/drawing/2010/main" val="0"/>
-              </a:ext>
-            </a:extLst>
-          </a:blip>
-          <a:stretch>
-            <a:fillRect/>
-          </a:stretch>
-        </p:blipFill>
-        <p:spPr>
-          <a:xfrm>
-            <a:off x="7408911" y="2322670"/>
-            <a:ext cx="4755441" cy="7065109"/>
-          </a:xfrm>
-        </p:spPr>
-      </p:pic>
-      <p:pic>
-        <p:nvPicPr>
           <p:cNvPr id="1027" name="Picture 3"/>
           <p:cNvPicPr>
             <a:picLocks noChangeAspect="1" noChangeArrowheads="1"/>
@@ -3482,7 +3447,7 @@
           <p:nvPr/>
         </p:nvPicPr>
         <p:blipFill>
-          <a:blip r:embed="rId3">
+          <a:blip r:embed="rId2">
             <a:extLst>
               <a:ext uri="{28A0092B-C50C-407E-A947-70E740481C1C}">
                 <a14:useLocalDpi xmlns:a14="http://schemas.microsoft.com/office/drawing/2010/main" val="0"/>
@@ -3536,7 +3501,7 @@
           <p:nvPr/>
         </p:nvPicPr>
         <p:blipFill>
-          <a:blip r:embed="rId4" cstate="print">
+          <a:blip r:embed="rId3" cstate="print">
             <a:extLst>
               <a:ext uri="{28A0092B-C50C-407E-A947-70E740481C1C}">
                 <a14:useLocalDpi xmlns:a14="http://schemas.microsoft.com/office/drawing/2010/main" val="0"/>
@@ -3575,7 +3540,7 @@
           <p:nvPr/>
         </p:nvPicPr>
         <p:blipFill>
-          <a:blip r:embed="rId5">
+          <a:blip r:embed="rId4">
             <a:extLst>
               <a:ext uri="{28A0092B-C50C-407E-A947-70E740481C1C}">
                 <a14:useLocalDpi xmlns:a14="http://schemas.microsoft.com/office/drawing/2010/main" val="0"/>
@@ -3616,7 +3581,7 @@
           <p:nvPr/>
         </p:nvPicPr>
         <p:blipFill>
-          <a:blip r:embed="rId5">
+          <a:blip r:embed="rId4">
             <a:extLst>
               <a:ext uri="{28A0092B-C50C-407E-A947-70E740481C1C}">
                 <a14:useLocalDpi xmlns:a14="http://schemas.microsoft.com/office/drawing/2010/main" val="0"/>
@@ -3657,7 +3622,7 @@
           <p:nvPr/>
         </p:nvPicPr>
         <p:blipFill>
-          <a:blip r:embed="rId5">
+          <a:blip r:embed="rId4">
             <a:extLst>
               <a:ext uri="{28A0092B-C50C-407E-A947-70E740481C1C}">
                 <a14:useLocalDpi xmlns:a14="http://schemas.microsoft.com/office/drawing/2010/main" val="0"/>
@@ -3716,61 +3681,187 @@
           <a:lstStyle/>
           <a:p>
             <a:r>
-              <a:rPr lang="pt-PT" sz="4800" dirty="0"/>
-              <a:t>Web </a:t>
-            </a:r>
-            <a:r>
-              <a:rPr lang="pt-PT" sz="4800" dirty="0" err="1"/>
-              <a:t>Meteo</a:t>
-            </a:r>
-            <a:r>
-              <a:rPr lang="pt-PT" sz="4800" dirty="0"/>
-              <a:t> com inteligência artificial</a:t>
-            </a:r>
-          </a:p>
-        </p:txBody>
-      </p:sp>
-      <p:pic>
-        <p:nvPicPr>
-          <p:cNvPr id="13" name="Content Placeholder 12" descr="A blue and black image&#10;&#10;Description automatically generated">
+              <a:rPr lang="pt-PT" sz="5400" dirty="0">
+                <a:latin typeface="Times New Roman" panose="02020603050405020304" pitchFamily="18" charset="0"/>
+                <a:cs typeface="Times New Roman" panose="02020603050405020304" pitchFamily="18" charset="0"/>
+              </a:rPr>
+              <a:t>Web Meteo com inteligência artificial</a:t>
+            </a:r>
+          </a:p>
+        </p:txBody>
+      </p:sp>
+      <p:sp>
+        <p:nvSpPr>
+          <p:cNvPr id="4" name="TextBox 3">
             <a:extLst>
               <a:ext uri="{FF2B5EF4-FFF2-40B4-BE49-F238E27FC236}">
-                <a16:creationId xmlns:a16="http://schemas.microsoft.com/office/drawing/2014/main" id="{FBB39E14-B8DB-B610-99A2-C17D4CC57293}"/>
+                <a16:creationId xmlns:a16="http://schemas.microsoft.com/office/drawing/2014/main" id="{667DAA22-528A-00E9-0F1A-EC70F5F1FB26}"/>
               </a:ext>
             </a:extLst>
           </p:cNvPr>
-          <p:cNvPicPr>
-            <a:picLocks noGrp="1" noChangeAspect="1"/>
-          </p:cNvPicPr>
-          <p:nvPr>
-            <p:ph sz="half" idx="1"/>
-          </p:nvPr>
-        </p:nvPicPr>
-        <p:blipFill>
-          <a:blip r:embed="rId6" cstate="print">
+          <p:cNvSpPr txBox="1"/>
+          <p:nvPr/>
+        </p:nvSpPr>
+        <p:spPr>
+          <a:xfrm>
+            <a:off x="155575" y="2412386"/>
+            <a:ext cx="8365322" cy="2031325"/>
+          </a:xfrm>
+          <a:prstGeom prst="rect">
+            <a:avLst/>
+          </a:prstGeom>
+          <a:noFill/>
+        </p:spPr>
+        <p:txBody>
+          <a:bodyPr wrap="square" rtlCol="0">
+            <a:spAutoFit/>
+          </a:bodyPr>
+          <a:lstStyle/>
+          <a:p>
+            <a:r>
+              <a:rPr lang="pt-PT" sz="1800" dirty="0"/>
+              <a:t>Projeto realizado por:</a:t>
+            </a:r>
+          </a:p>
+          <a:p>
+            <a:r>
+              <a:rPr lang="pt-PT" sz="1800" dirty="0"/>
+              <a:t>→ Edgar Filipe da Silva Mendes</a:t>
+            </a:r>
+          </a:p>
+          <a:p>
+            <a:r>
+              <a:rPr lang="pt-PT" sz="1800" dirty="0"/>
+              <a:t>→ João Rafael Freitas Oliveira</a:t>
+            </a:r>
+          </a:p>
+          <a:p>
+            <a:endParaRPr lang="pt-PT" sz="1800" dirty="0"/>
+          </a:p>
+          <a:p>
+            <a:r>
+              <a:rPr lang="pt-PT" sz="1800" dirty="0"/>
+              <a:t>Sob orientação de:</a:t>
+            </a:r>
+          </a:p>
+          <a:p>
+            <a:r>
+              <a:rPr lang="pt-PT" sz="1800" dirty="0"/>
+              <a:t>→ Professor Doutor João da Silva Costa</a:t>
+            </a:r>
+          </a:p>
+          <a:p>
+            <a:r>
+              <a:rPr lang="pt-PT" sz="1800" dirty="0"/>
+              <a:t>→ Professor Doutor </a:t>
+            </a:r>
+            <a:r>
+              <a:rPr lang="pt-BR" sz="1800" dirty="0"/>
+              <a:t>Rui Vasco Guerra Baptista Monteiro</a:t>
+            </a:r>
+            <a:endParaRPr lang="pt-PT" sz="1800" dirty="0"/>
+          </a:p>
+        </p:txBody>
+      </p:sp>
+      <p:grpSp>
+        <p:nvGrpSpPr>
+          <p:cNvPr id="14" name="Group 13">
             <a:extLst>
-              <a:ext uri="{28A0092B-C50C-407E-A947-70E740481C1C}">
-                <a14:useLocalDpi xmlns:a14="http://schemas.microsoft.com/office/drawing/2010/main" val="0"/>
+              <a:ext uri="{FF2B5EF4-FFF2-40B4-BE49-F238E27FC236}">
+                <a16:creationId xmlns:a16="http://schemas.microsoft.com/office/drawing/2014/main" id="{CFCA0199-8508-2CA9-B040-0EE38BBE99AB}"/>
               </a:ext>
             </a:extLst>
-          </a:blip>
-          <a:stretch>
-            <a:fillRect/>
-          </a:stretch>
-        </p:blipFill>
-        <p:spPr>
+          </p:cNvPr>
+          <p:cNvGrpSpPr/>
+          <p:nvPr/>
+        </p:nvGrpSpPr>
+        <p:grpSpPr>
           <a:xfrm>
-            <a:off x="7624936" y="2686574"/>
-            <a:ext cx="4078056" cy="6337300"/>
+            <a:off x="8489032" y="2558469"/>
+            <a:ext cx="3858579" cy="5914539"/>
+            <a:chOff x="7987946" y="2558469"/>
+            <a:chExt cx="4359665" cy="6718971"/>
           </a:xfrm>
-        </p:spPr>
-      </p:pic>
+        </p:grpSpPr>
+        <p:pic>
+          <p:nvPicPr>
+            <p:cNvPr id="11" name="Picture 10" descr="A map of portugal with black text&#10;&#10;Description automatically generated">
+              <a:extLst>
+                <a:ext uri="{FF2B5EF4-FFF2-40B4-BE49-F238E27FC236}">
+                  <a16:creationId xmlns:a16="http://schemas.microsoft.com/office/drawing/2014/main" id="{4B395B13-6AD4-9F79-7207-FF5AFCB6657A}"/>
+                </a:ext>
+              </a:extLst>
+            </p:cNvPr>
+            <p:cNvPicPr>
+              <a:picLocks noChangeAspect="1"/>
+            </p:cNvPicPr>
+            <p:nvPr/>
+          </p:nvPicPr>
+          <p:blipFill>
+            <a:blip r:embed="rId5" cstate="print">
+              <a:extLst>
+                <a:ext uri="{28A0092B-C50C-407E-A947-70E740481C1C}">
+                  <a14:useLocalDpi xmlns:a14="http://schemas.microsoft.com/office/drawing/2010/main" val="0"/>
+                </a:ext>
+              </a:extLst>
+            </a:blip>
+            <a:stretch>
+              <a:fillRect/>
+            </a:stretch>
+          </p:blipFill>
+          <p:spPr>
+            <a:xfrm>
+              <a:off x="7987946" y="2651728"/>
+              <a:ext cx="4282381" cy="6362288"/>
+            </a:xfrm>
+            <a:prstGeom prst="rect">
+              <a:avLst/>
+            </a:prstGeom>
+          </p:spPr>
+        </p:pic>
+        <p:pic>
+          <p:nvPicPr>
+            <p:cNvPr id="9" name="Picture 8" descr="A blue and black image">
+              <a:extLst>
+                <a:ext uri="{FF2B5EF4-FFF2-40B4-BE49-F238E27FC236}">
+                  <a16:creationId xmlns:a16="http://schemas.microsoft.com/office/drawing/2014/main" id="{A1EA9F22-4AEF-4A4E-A2C7-77598ED0B4A2}"/>
+                </a:ext>
+              </a:extLst>
+            </p:cNvPr>
+            <p:cNvPicPr>
+              <a:picLocks noChangeAspect="1"/>
+            </p:cNvPicPr>
+            <p:nvPr/>
+          </p:nvPicPr>
+          <p:blipFill>
+            <a:blip r:embed="rId6" cstate="print">
+              <a:extLst>
+                <a:ext uri="{28A0092B-C50C-407E-A947-70E740481C1C}">
+                  <a14:useLocalDpi xmlns:a14="http://schemas.microsoft.com/office/drawing/2010/main" val="0"/>
+                </a:ext>
+              </a:extLst>
+            </a:blip>
+            <a:stretch>
+              <a:fillRect/>
+            </a:stretch>
+          </p:blipFill>
+          <p:spPr>
+            <a:xfrm>
+              <a:off x="8023949" y="2558469"/>
+              <a:ext cx="4323662" cy="6718971"/>
+            </a:xfrm>
+            <a:prstGeom prst="rect">
+              <a:avLst/>
+            </a:prstGeom>
+          </p:spPr>
+        </p:pic>
+      </p:grpSp>
       <p:pic>
         <p:nvPicPr>
-          <p:cNvPr id="15" name="Picture 14">
+          <p:cNvPr id="17" name="Picture 16">
             <a:extLst>
               <a:ext uri="{FF2B5EF4-FFF2-40B4-BE49-F238E27FC236}">
-                <a16:creationId xmlns:a16="http://schemas.microsoft.com/office/drawing/2014/main" id="{6E8733F6-F153-70FD-77C7-5C837D1791BF}"/>
+                <a16:creationId xmlns:a16="http://schemas.microsoft.com/office/drawing/2014/main" id="{7C43E8DA-7896-9A78-CB2B-B0451802846E}"/>
               </a:ext>
             </a:extLst>
           </p:cNvPr>
@@ -3787,8 +3878,8 @@
         </p:blipFill>
         <p:spPr>
           <a:xfrm>
-            <a:off x="4215636" y="4440560"/>
-            <a:ext cx="3193276" cy="4947219"/>
+            <a:off x="6216824" y="4512568"/>
+            <a:ext cx="3024336" cy="4723144"/>
           </a:xfrm>
           <a:prstGeom prst="rect">
             <a:avLst/>

</xml_diff>